<commit_message>
First Final Draft of chapters 1 and 2
</commit_message>
<xml_diff>
--- a/Lectures/Extras/Introduction Extras.pptx
+++ b/Lectures/Extras/Introduction Extras.pptx
@@ -30853,6 +30853,90 @@
       </p:grpSpPr>
       <p:sp>
         <p:nvSpPr>
+          <p:cNvPr id="2" name="Title 1"/>
+          <p:cNvSpPr>
+            <a:spLocks noGrp="1"/>
+          </p:cNvSpPr>
+          <p:nvPr>
+            <p:ph type="title"/>
+          </p:nvPr>
+        </p:nvSpPr>
+        <p:spPr>
+          <a:xfrm>
+            <a:off x="457200" y="228600"/>
+            <a:ext cx="6400800" cy="1143000"/>
+          </a:xfrm>
+        </p:spPr>
+        <p:txBody>
+          <a:bodyPr/>
+          <a:lstStyle/>
+          <a:p>
+            <a:r>
+              <a:rPr lang="en-US" dirty="0"/>
+              <a:t>What are</a:t>
+            </a:r>
+            <a:endParaRPr lang="en-US" dirty="0">
+              <a:solidFill>
+                <a:schemeClr val="tx1">
+                  <a:lumMod val="95000"/>
+                  <a:lumOff val="5000"/>
+                </a:schemeClr>
+              </a:solidFill>
+            </a:endParaRPr>
+          </a:p>
+        </p:txBody>
+      </p:sp>
+      <p:sp>
+        <p:nvSpPr>
+          <p:cNvPr id="5" name="Oval 4">
+            <a:extLst>
+              <a:ext uri="{FF2B5EF4-FFF2-40B4-BE49-F238E27FC236}">
+                <a16:creationId xmlns:a16="http://schemas.microsoft.com/office/drawing/2014/main" id="{18563292-3BC5-46C6-A30D-42AFEA74737E}"/>
+              </a:ext>
+            </a:extLst>
+          </p:cNvPr>
+          <p:cNvSpPr/>
+          <p:nvPr/>
+        </p:nvSpPr>
+        <p:spPr>
+          <a:xfrm>
+            <a:off x="4800600" y="381000"/>
+            <a:ext cx="2819400" cy="838200"/>
+          </a:xfrm>
+          <a:prstGeom prst="ellipse">
+            <a:avLst/>
+          </a:prstGeom>
+        </p:spPr>
+        <p:style>
+          <a:lnRef idx="2">
+            <a:schemeClr val="accent4">
+              <a:shade val="50000"/>
+            </a:schemeClr>
+          </a:lnRef>
+          <a:fillRef idx="1">
+            <a:schemeClr val="accent4"/>
+          </a:fillRef>
+          <a:effectRef idx="0">
+            <a:schemeClr val="accent4"/>
+          </a:effectRef>
+          <a:fontRef idx="minor">
+            <a:schemeClr val="lt1"/>
+          </a:fontRef>
+        </p:style>
+        <p:txBody>
+          <a:bodyPr rtlCol="0" anchor="ctr"/>
+          <a:lstStyle/>
+          <a:p>
+            <a:pPr algn="ctr"/>
+            <a:r>
+              <a:rPr lang="en-US" sz="4400" dirty="0"/>
+              <a:t>extras?</a:t>
+            </a:r>
+          </a:p>
+        </p:txBody>
+      </p:sp>
+      <p:sp>
+        <p:nvSpPr>
           <p:cNvPr id="6" name="Oval 5">
             <a:extLst>
               <a:ext uri="{FF2B5EF4-FFF2-40B4-BE49-F238E27FC236}">
@@ -30899,47 +30983,6 @@
       </p:sp>
       <p:sp>
         <p:nvSpPr>
-          <p:cNvPr id="2" name="Title 1"/>
-          <p:cNvSpPr>
-            <a:spLocks noGrp="1"/>
-          </p:cNvSpPr>
-          <p:nvPr>
-            <p:ph type="title"/>
-          </p:nvPr>
-        </p:nvSpPr>
-        <p:spPr/>
-        <p:txBody>
-          <a:bodyPr/>
-          <a:lstStyle/>
-          <a:p>
-            <a:r>
-              <a:rPr lang="en-US" dirty="0"/>
-              <a:t>What are</a:t>
-            </a:r>
-            <a:br>
-              <a:rPr lang="en-US" dirty="0"/>
-            </a:br>
-            <a:r>
-              <a:rPr lang="en-US" dirty="0">
-                <a:solidFill>
-                  <a:schemeClr val="bg1"/>
-                </a:solidFill>
-              </a:rPr>
-              <a:t>extras?</a:t>
-            </a:r>
-            <a:endParaRPr lang="en-US" dirty="0">
-              <a:solidFill>
-                <a:schemeClr val="tx1">
-                  <a:lumMod val="95000"/>
-                  <a:lumOff val="5000"/>
-                </a:schemeClr>
-              </a:solidFill>
-            </a:endParaRPr>
-          </a:p>
-        </p:txBody>
-      </p:sp>
-      <p:sp>
-        <p:nvSpPr>
           <p:cNvPr id="3" name="Content Placeholder 2"/>
           <p:cNvSpPr>
             <a:spLocks noGrp="1"/>
@@ -30980,52 +31023,6 @@
               <a:rPr lang="en-US" dirty="0"/>
               <a:t>While fun and exciting, this information will not be on any Design Challenges or exams</a:t>
             </a:r>
-          </a:p>
-        </p:txBody>
-      </p:sp>
-      <p:sp>
-        <p:nvSpPr>
-          <p:cNvPr id="5" name="Oval 4">
-            <a:extLst>
-              <a:ext uri="{FF2B5EF4-FFF2-40B4-BE49-F238E27FC236}">
-                <a16:creationId xmlns:a16="http://schemas.microsoft.com/office/drawing/2014/main" id="{18563292-3BC5-46C6-A30D-42AFEA74737E}"/>
-              </a:ext>
-            </a:extLst>
-          </p:cNvPr>
-          <p:cNvSpPr/>
-          <p:nvPr/>
-        </p:nvSpPr>
-        <p:spPr>
-          <a:xfrm>
-            <a:off x="3276600" y="762000"/>
-            <a:ext cx="2819400" cy="838200"/>
-          </a:xfrm>
-          <a:prstGeom prst="ellipse">
-            <a:avLst/>
-          </a:prstGeom>
-        </p:spPr>
-        <p:style>
-          <a:lnRef idx="2">
-            <a:schemeClr val="accent4">
-              <a:shade val="50000"/>
-            </a:schemeClr>
-          </a:lnRef>
-          <a:fillRef idx="1">
-            <a:schemeClr val="accent4"/>
-          </a:fillRef>
-          <a:effectRef idx="0">
-            <a:schemeClr val="accent4"/>
-          </a:effectRef>
-          <a:fontRef idx="minor">
-            <a:schemeClr val="lt1"/>
-          </a:fontRef>
-        </p:style>
-        <p:txBody>
-          <a:bodyPr rtlCol="0" anchor="ctr"/>
-          <a:lstStyle/>
-          <a:p>
-            <a:pPr algn="ctr"/>
-            <a:endParaRPr lang="en-US"/>
           </a:p>
         </p:txBody>
       </p:sp>

</xml_diff>